<commit_message>
Don't need separate ppt for demo anymore, so deleted it.  Also fixed typo in presentation.
</commit_message>
<xml_diff>
--- a/docs/presentation/Geppetto Presentation.pptx
+++ b/docs/presentation/Geppetto Presentation.pptx
@@ -1947,6 +1947,13 @@
         </dgm:presLayoutVars>
       </dgm:prSet>
       <dgm:spPr/>
+      <dgm:t>
+        <a:bodyPr/>
+        <a:lstStyle/>
+        <a:p>
+          <a:endParaRPr lang="en-US"/>
+        </a:p>
+      </dgm:t>
     </dgm:pt>
     <dgm:pt modelId="{B164E85E-1B0B-4C42-838E-CBA56EA2F911}" type="pres">
       <dgm:prSet presAssocID="{8BC7E7E0-F82B-4300-9B57-A3A377B91DEF}" presName="linNode" presStyleCnt="0"/>
@@ -1960,6 +1967,13 @@
         </dgm:presLayoutVars>
       </dgm:prSet>
       <dgm:spPr/>
+      <dgm:t>
+        <a:bodyPr/>
+        <a:lstStyle/>
+        <a:p>
+          <a:endParaRPr lang="en-US"/>
+        </a:p>
+      </dgm:t>
     </dgm:pt>
     <dgm:pt modelId="{AD12101F-9F6C-4EE8-9D11-0F7603DC7E50}" type="pres">
       <dgm:prSet presAssocID="{8BC7E7E0-F82B-4300-9B57-A3A377B91DEF}" presName="descendantText" presStyleLbl="alignAccFollowNode1" presStyleIdx="0" presStyleCnt="3">
@@ -1992,6 +2006,13 @@
         </dgm:presLayoutVars>
       </dgm:prSet>
       <dgm:spPr/>
+      <dgm:t>
+        <a:bodyPr/>
+        <a:lstStyle/>
+        <a:p>
+          <a:endParaRPr lang="en-US"/>
+        </a:p>
+      </dgm:t>
     </dgm:pt>
     <dgm:pt modelId="{1C0F4F65-5AE1-425E-A4E5-09C75BD7982D}" type="pres">
       <dgm:prSet presAssocID="{943075E1-1A96-4852-835A-6CE1AC872004}" presName="descendantText" presStyleLbl="alignAccFollowNode1" presStyleIdx="1" presStyleCnt="3">
@@ -2024,6 +2045,13 @@
         </dgm:presLayoutVars>
       </dgm:prSet>
       <dgm:spPr/>
+      <dgm:t>
+        <a:bodyPr/>
+        <a:lstStyle/>
+        <a:p>
+          <a:endParaRPr lang="en-US"/>
+        </a:p>
+      </dgm:t>
     </dgm:pt>
     <dgm:pt modelId="{A246BEA2-B0FD-498A-B4BA-5BF2862A7A07}" type="pres">
       <dgm:prSet presAssocID="{A1A00749-3B2E-4630-BEBE-0C43BEC390F2}" presName="descendantText" presStyleLbl="alignAccFollowNode1" presStyleIdx="2" presStyleCnt="3">
@@ -2042,21 +2070,21 @@
     </dgm:pt>
   </dgm:ptLst>
   <dgm:cxnLst>
-    <dgm:cxn modelId="{BE04EFC3-05E8-4446-A0A2-0B82ABD1EF63}" type="presOf" srcId="{806A266A-4D7F-44C6-8FB6-19B7FD950EA0}" destId="{108D03DC-8D6C-490B-92CC-AEF738700A2D}" srcOrd="0" destOrd="0" presId="urn:microsoft.com/office/officeart/2005/8/layout/vList5"/>
     <dgm:cxn modelId="{ED1DAC45-DDA9-4A1A-8FE3-2D65B32E9837}" type="presOf" srcId="{A1A00749-3B2E-4630-BEBE-0C43BEC390F2}" destId="{169EE32D-D7F1-435B-B6C7-3F5C5FAE4225}" srcOrd="0" destOrd="0" presId="urn:microsoft.com/office/officeart/2005/8/layout/vList5"/>
-    <dgm:cxn modelId="{B472533D-E7CC-41A7-AA53-B534F0679769}" srcId="{A1A00749-3B2E-4630-BEBE-0C43BEC390F2}" destId="{B110D4D8-097F-48ED-90D5-66C5875730F0}" srcOrd="0" destOrd="0" parTransId="{F685E7A7-C2BD-4A6E-A7FA-BF24FF9AA529}" sibTransId="{17B6D53C-DA82-4233-A103-F611C72000B9}"/>
     <dgm:cxn modelId="{883FD195-8EFE-40B3-8FB7-8989EDE93D91}" type="presOf" srcId="{D17E873E-BD0A-4FD8-A355-90CAE9709D9C}" destId="{AD12101F-9F6C-4EE8-9D11-0F7603DC7E50}" srcOrd="0" destOrd="1" presId="urn:microsoft.com/office/officeart/2005/8/layout/vList5"/>
+    <dgm:cxn modelId="{4D6F5C4A-067F-4A70-A511-E83B76557C30}" srcId="{8BC7E7E0-F82B-4300-9B57-A3A377B91DEF}" destId="{D17E873E-BD0A-4FD8-A355-90CAE9709D9C}" srcOrd="1" destOrd="0" parTransId="{49974EF3-95AB-479F-8368-0056F8C5A001}" sibTransId="{D02AF8B4-CA3A-4C62-89CA-D94035E8E462}"/>
+    <dgm:cxn modelId="{C7818E67-31FD-4F16-B822-F2382C3E5F14}" type="presOf" srcId="{CD37E855-4071-4AE7-8D9B-B08B3DF58C32}" destId="{1C0F4F65-5AE1-425E-A4E5-09C75BD7982D}" srcOrd="0" destOrd="0" presId="urn:microsoft.com/office/officeart/2005/8/layout/vList5"/>
+    <dgm:cxn modelId="{171A25FF-EB2C-4846-83C8-06A783EAC18F}" srcId="{806A266A-4D7F-44C6-8FB6-19B7FD950EA0}" destId="{8BC7E7E0-F82B-4300-9B57-A3A377B91DEF}" srcOrd="0" destOrd="0" parTransId="{2F4E99E0-71B7-40BA-AA4C-4051C6D149FF}" sibTransId="{6B24AC77-8CD9-4AEA-9327-E23E4DD9149A}"/>
     <dgm:cxn modelId="{5424B585-2E63-486E-BE96-B811C9B25A2D}" srcId="{806A266A-4D7F-44C6-8FB6-19B7FD950EA0}" destId="{943075E1-1A96-4852-835A-6CE1AC872004}" srcOrd="1" destOrd="0" parTransId="{B10AFE9A-C57E-4D7E-8227-5AB4B1A8234A}" sibTransId="{ECEBD48F-F8C6-420E-8F80-81B0210CFE61}"/>
     <dgm:cxn modelId="{19376B06-F0DA-4F95-9A1B-2FE6FACFA7B9}" type="presOf" srcId="{8BC7E7E0-F82B-4300-9B57-A3A377B91DEF}" destId="{C9A18CBE-5607-47E8-AFC4-3D1D919FAEE7}" srcOrd="0" destOrd="0" presId="urn:microsoft.com/office/officeart/2005/8/layout/vList5"/>
-    <dgm:cxn modelId="{4D6F5C4A-067F-4A70-A511-E83B76557C30}" srcId="{8BC7E7E0-F82B-4300-9B57-A3A377B91DEF}" destId="{D17E873E-BD0A-4FD8-A355-90CAE9709D9C}" srcOrd="1" destOrd="0" parTransId="{49974EF3-95AB-479F-8368-0056F8C5A001}" sibTransId="{D02AF8B4-CA3A-4C62-89CA-D94035E8E462}"/>
-    <dgm:cxn modelId="{C7818E67-31FD-4F16-B822-F2382C3E5F14}" type="presOf" srcId="{CD37E855-4071-4AE7-8D9B-B08B3DF58C32}" destId="{1C0F4F65-5AE1-425E-A4E5-09C75BD7982D}" srcOrd="0" destOrd="0" presId="urn:microsoft.com/office/officeart/2005/8/layout/vList5"/>
     <dgm:cxn modelId="{00D51152-9225-4DA0-82B8-91EFC894F478}" type="presOf" srcId="{943075E1-1A96-4852-835A-6CE1AC872004}" destId="{9FF76363-C87F-43FB-AF0A-A3C4467667B9}" srcOrd="0" destOrd="0" presId="urn:microsoft.com/office/officeart/2005/8/layout/vList5"/>
+    <dgm:cxn modelId="{98969A43-ED4F-495E-B761-A9544CF15C5E}" srcId="{806A266A-4D7F-44C6-8FB6-19B7FD950EA0}" destId="{A1A00749-3B2E-4630-BEBE-0C43BEC390F2}" srcOrd="2" destOrd="0" parTransId="{0F0E79F9-1454-4E54-AEFF-C782DBDEFDC1}" sibTransId="{CDA68BC4-94DB-49F4-8ADE-EDEE10FFECD7}"/>
     <dgm:cxn modelId="{B4A2ABD2-1453-4421-8FE6-0C2AAF943285}" type="presOf" srcId="{B110D4D8-097F-48ED-90D5-66C5875730F0}" destId="{A246BEA2-B0FD-498A-B4BA-5BF2862A7A07}" srcOrd="0" destOrd="0" presId="urn:microsoft.com/office/officeart/2005/8/layout/vList5"/>
     <dgm:cxn modelId="{BB11CC94-D693-4556-A85C-327EA14E8008}" type="presOf" srcId="{0C236159-6E5F-473F-8105-4BFA79A5BF5F}" destId="{AD12101F-9F6C-4EE8-9D11-0F7603DC7E50}" srcOrd="0" destOrd="0" presId="urn:microsoft.com/office/officeart/2005/8/layout/vList5"/>
+    <dgm:cxn modelId="{BE04EFC3-05E8-4446-A0A2-0B82ABD1EF63}" type="presOf" srcId="{806A266A-4D7F-44C6-8FB6-19B7FD950EA0}" destId="{108D03DC-8D6C-490B-92CC-AEF738700A2D}" srcOrd="0" destOrd="0" presId="urn:microsoft.com/office/officeart/2005/8/layout/vList5"/>
+    <dgm:cxn modelId="{B472533D-E7CC-41A7-AA53-B534F0679769}" srcId="{A1A00749-3B2E-4630-BEBE-0C43BEC390F2}" destId="{B110D4D8-097F-48ED-90D5-66C5875730F0}" srcOrd="0" destOrd="0" parTransId="{F685E7A7-C2BD-4A6E-A7FA-BF24FF9AA529}" sibTransId="{17B6D53C-DA82-4233-A103-F611C72000B9}"/>
     <dgm:cxn modelId="{01B57E2E-779F-402A-B54D-27341511E1C3}" srcId="{943075E1-1A96-4852-835A-6CE1AC872004}" destId="{CD37E855-4071-4AE7-8D9B-B08B3DF58C32}" srcOrd="0" destOrd="0" parTransId="{07991533-9DCC-46D5-A17C-D78C2B98A0EB}" sibTransId="{C2706603-6395-4550-A1C3-338142827521}"/>
-    <dgm:cxn modelId="{171A25FF-EB2C-4846-83C8-06A783EAC18F}" srcId="{806A266A-4D7F-44C6-8FB6-19B7FD950EA0}" destId="{8BC7E7E0-F82B-4300-9B57-A3A377B91DEF}" srcOrd="0" destOrd="0" parTransId="{2F4E99E0-71B7-40BA-AA4C-4051C6D149FF}" sibTransId="{6B24AC77-8CD9-4AEA-9327-E23E4DD9149A}"/>
     <dgm:cxn modelId="{78BB0CE7-00BB-44C2-BB18-19B4E1357FEF}" srcId="{8BC7E7E0-F82B-4300-9B57-A3A377B91DEF}" destId="{0C236159-6E5F-473F-8105-4BFA79A5BF5F}" srcOrd="0" destOrd="0" parTransId="{2CEA84AC-B8AF-41B0-9E39-0EAE7EE71333}" sibTransId="{2048E944-20FA-4EC5-A962-A0C3C0B784E2}"/>
-    <dgm:cxn modelId="{98969A43-ED4F-495E-B761-A9544CF15C5E}" srcId="{806A266A-4D7F-44C6-8FB6-19B7FD950EA0}" destId="{A1A00749-3B2E-4630-BEBE-0C43BEC390F2}" srcOrd="2" destOrd="0" parTransId="{0F0E79F9-1454-4E54-AEFF-C782DBDEFDC1}" sibTransId="{CDA68BC4-94DB-49F4-8ADE-EDEE10FFECD7}"/>
     <dgm:cxn modelId="{383AAB9E-26FB-459B-9517-69806EE6724C}" type="presParOf" srcId="{108D03DC-8D6C-490B-92CC-AEF738700A2D}" destId="{B164E85E-1B0B-4C42-838E-CBA56EA2F911}" srcOrd="0" destOrd="0" presId="urn:microsoft.com/office/officeart/2005/8/layout/vList5"/>
     <dgm:cxn modelId="{6B9C3572-AB39-4E57-B9A9-A530973EFC73}" type="presParOf" srcId="{B164E85E-1B0B-4C42-838E-CBA56EA2F911}" destId="{C9A18CBE-5607-47E8-AFC4-3D1D919FAEE7}" srcOrd="0" destOrd="0" presId="urn:microsoft.com/office/officeart/2005/8/layout/vList5"/>
     <dgm:cxn modelId="{20619BD5-4EFF-4AF6-8E60-A1B428A8DF4C}" type="presParOf" srcId="{B164E85E-1B0B-4C42-838E-CBA56EA2F911}" destId="{AD12101F-9F6C-4EE8-9D11-0F7603DC7E50}" srcOrd="1" destOrd="0" presId="urn:microsoft.com/office/officeart/2005/8/layout/vList5"/>
@@ -2338,6 +2366,13 @@
         </dgm:presLayoutVars>
       </dgm:prSet>
       <dgm:spPr/>
+      <dgm:t>
+        <a:bodyPr/>
+        <a:lstStyle/>
+        <a:p>
+          <a:endParaRPr lang="en-US"/>
+        </a:p>
+      </dgm:t>
     </dgm:pt>
     <dgm:pt modelId="{B071A5F6-EE7B-40B8-9091-4E4774E56F4B}" type="pres">
       <dgm:prSet presAssocID="{0A448312-3B0C-4540-B505-6A03E30E35CA}" presName="root1" presStyleCnt="0"/>
@@ -2350,6 +2385,13 @@
         </dgm:presLayoutVars>
       </dgm:prSet>
       <dgm:spPr/>
+      <dgm:t>
+        <a:bodyPr/>
+        <a:lstStyle/>
+        <a:p>
+          <a:endParaRPr lang="en-US"/>
+        </a:p>
+      </dgm:t>
     </dgm:pt>
     <dgm:pt modelId="{3BC56FAD-3BAE-4E1D-BC2B-4D3E81D5EDF1}" type="pres">
       <dgm:prSet presAssocID="{0A448312-3B0C-4540-B505-6A03E30E35CA}" presName="level2hierChild" presStyleCnt="0"/>
@@ -2358,10 +2400,24 @@
     <dgm:pt modelId="{99BCE6CA-01BB-4C82-AA51-F8CEB688CCA7}" type="pres">
       <dgm:prSet presAssocID="{10E06AE5-7B5C-4249-9A50-CA231E1A53B8}" presName="conn2-1" presStyleLbl="parChTrans1D2" presStyleIdx="0" presStyleCnt="2"/>
       <dgm:spPr/>
+      <dgm:t>
+        <a:bodyPr/>
+        <a:lstStyle/>
+        <a:p>
+          <a:endParaRPr lang="en-US"/>
+        </a:p>
+      </dgm:t>
     </dgm:pt>
     <dgm:pt modelId="{9F518FBB-059C-43EE-8AF6-4EB09A85C8CF}" type="pres">
       <dgm:prSet presAssocID="{10E06AE5-7B5C-4249-9A50-CA231E1A53B8}" presName="connTx" presStyleLbl="parChTrans1D2" presStyleIdx="0" presStyleCnt="2"/>
       <dgm:spPr/>
+      <dgm:t>
+        <a:bodyPr/>
+        <a:lstStyle/>
+        <a:p>
+          <a:endParaRPr lang="en-US"/>
+        </a:p>
+      </dgm:t>
     </dgm:pt>
     <dgm:pt modelId="{861641DA-54C3-487F-A883-92474C149EC5}" type="pres">
       <dgm:prSet presAssocID="{3BC7471E-1D96-4380-A909-52284375D05F}" presName="root2" presStyleCnt="0"/>
@@ -2374,6 +2430,13 @@
         </dgm:presLayoutVars>
       </dgm:prSet>
       <dgm:spPr/>
+      <dgm:t>
+        <a:bodyPr/>
+        <a:lstStyle/>
+        <a:p>
+          <a:endParaRPr lang="en-US"/>
+        </a:p>
+      </dgm:t>
     </dgm:pt>
     <dgm:pt modelId="{CE86C923-48B8-47F0-841C-A7902D250777}" type="pres">
       <dgm:prSet presAssocID="{3BC7471E-1D96-4380-A909-52284375D05F}" presName="level3hierChild" presStyleCnt="0"/>
@@ -2382,10 +2445,24 @@
     <dgm:pt modelId="{CFEF8F59-F70D-4463-BE3C-4EC220C677EB}" type="pres">
       <dgm:prSet presAssocID="{C120922A-3514-4D40-AA5A-0240F91FD9C7}" presName="conn2-1" presStyleLbl="parChTrans1D3" presStyleIdx="0" presStyleCnt="2"/>
       <dgm:spPr/>
+      <dgm:t>
+        <a:bodyPr/>
+        <a:lstStyle/>
+        <a:p>
+          <a:endParaRPr lang="en-US"/>
+        </a:p>
+      </dgm:t>
     </dgm:pt>
     <dgm:pt modelId="{902FB5CB-8755-41AE-A266-B99A46E3A5D6}" type="pres">
       <dgm:prSet presAssocID="{C120922A-3514-4D40-AA5A-0240F91FD9C7}" presName="connTx" presStyleLbl="parChTrans1D3" presStyleIdx="0" presStyleCnt="2"/>
       <dgm:spPr/>
+      <dgm:t>
+        <a:bodyPr/>
+        <a:lstStyle/>
+        <a:p>
+          <a:endParaRPr lang="en-US"/>
+        </a:p>
+      </dgm:t>
     </dgm:pt>
     <dgm:pt modelId="{18DF0720-F0C7-4D7A-B7D6-313945474D75}" type="pres">
       <dgm:prSet presAssocID="{94ADDC59-067A-4C51-872A-44479A6EED3D}" presName="root2" presStyleCnt="0"/>
@@ -2413,10 +2490,24 @@
     <dgm:pt modelId="{5491C858-BB3A-4BCA-AC42-A6EEFFAD6FA1}" type="pres">
       <dgm:prSet presAssocID="{3CC7B6BB-B52C-4A13-B5DE-0A907012BD20}" presName="conn2-1" presStyleLbl="parChTrans1D3" presStyleIdx="1" presStyleCnt="2"/>
       <dgm:spPr/>
+      <dgm:t>
+        <a:bodyPr/>
+        <a:lstStyle/>
+        <a:p>
+          <a:endParaRPr lang="en-US"/>
+        </a:p>
+      </dgm:t>
     </dgm:pt>
     <dgm:pt modelId="{443CB2BE-876D-4221-9C0E-B549FAAB6BBA}" type="pres">
       <dgm:prSet presAssocID="{3CC7B6BB-B52C-4A13-B5DE-0A907012BD20}" presName="connTx" presStyleLbl="parChTrans1D3" presStyleIdx="1" presStyleCnt="2"/>
       <dgm:spPr/>
+      <dgm:t>
+        <a:bodyPr/>
+        <a:lstStyle/>
+        <a:p>
+          <a:endParaRPr lang="en-US"/>
+        </a:p>
+      </dgm:t>
     </dgm:pt>
     <dgm:pt modelId="{3318F0AC-6F72-47A9-8E84-2ADD37A57D90}" type="pres">
       <dgm:prSet presAssocID="{53C1448F-3988-4167-85C3-CCBBE7542B9C}" presName="root2" presStyleCnt="0"/>
@@ -2444,10 +2535,24 @@
     <dgm:pt modelId="{1C8EA34C-65B4-4B94-8D13-4E285225CE55}" type="pres">
       <dgm:prSet presAssocID="{EE26A890-2583-439F-9770-6601F93FDCEF}" presName="conn2-1" presStyleLbl="parChTrans1D2" presStyleIdx="1" presStyleCnt="2"/>
       <dgm:spPr/>
+      <dgm:t>
+        <a:bodyPr/>
+        <a:lstStyle/>
+        <a:p>
+          <a:endParaRPr lang="en-US"/>
+        </a:p>
+      </dgm:t>
     </dgm:pt>
     <dgm:pt modelId="{1BAE54A3-B719-4AAC-B04F-6234831A7E40}" type="pres">
       <dgm:prSet presAssocID="{EE26A890-2583-439F-9770-6601F93FDCEF}" presName="connTx" presStyleLbl="parChTrans1D2" presStyleIdx="1" presStyleCnt="2"/>
       <dgm:spPr/>
+      <dgm:t>
+        <a:bodyPr/>
+        <a:lstStyle/>
+        <a:p>
+          <a:endParaRPr lang="en-US"/>
+        </a:p>
+      </dgm:t>
     </dgm:pt>
     <dgm:pt modelId="{1E71A0BC-D31B-4909-A73E-5716F87CB620}" type="pres">
       <dgm:prSet presAssocID="{BF9CA6D6-C72B-475F-9E77-1429B2577A97}" presName="root2" presStyleCnt="0"/>
@@ -2460,6 +2565,13 @@
         </dgm:presLayoutVars>
       </dgm:prSet>
       <dgm:spPr/>
+      <dgm:t>
+        <a:bodyPr/>
+        <a:lstStyle/>
+        <a:p>
+          <a:endParaRPr lang="en-US"/>
+        </a:p>
+      </dgm:t>
     </dgm:pt>
     <dgm:pt modelId="{659DA585-C055-4ED5-AED5-2880582561E0}" type="pres">
       <dgm:prSet presAssocID="{BF9CA6D6-C72B-475F-9E77-1429B2577A97}" presName="level3hierChild" presStyleCnt="0"/>
@@ -2490,27 +2602,27 @@
     </dgm:pt>
   </dgm:ptLst>
   <dgm:cxnLst>
+    <dgm:cxn modelId="{A6111E65-51A6-40B4-8542-6045DFFEBA9F}" srcId="{0A448312-3B0C-4540-B505-6A03E30E35CA}" destId="{BF9CA6D6-C72B-475F-9E77-1429B2577A97}" srcOrd="1" destOrd="0" parTransId="{EE26A890-2583-439F-9770-6601F93FDCEF}" sibTransId="{C9056885-D3C8-4CD3-87E3-96AA7E23D960}"/>
+    <dgm:cxn modelId="{8A7233C2-ADCE-4D0A-8DBD-B5D6215FC37C}" srcId="{3BC7471E-1D96-4380-A909-52284375D05F}" destId="{53C1448F-3988-4167-85C3-CCBBE7542B9C}" srcOrd="1" destOrd="0" parTransId="{3CC7B6BB-B52C-4A13-B5DE-0A907012BD20}" sibTransId="{13CED3B3-DD1D-4935-B809-800E04365F44}"/>
+    <dgm:cxn modelId="{6D84FB39-F60E-4195-9BA7-A18A415105E7}" srcId="{8FAAEC49-56C2-4D9C-945E-91611FD7AD52}" destId="{0A448312-3B0C-4540-B505-6A03E30E35CA}" srcOrd="0" destOrd="0" parTransId="{CD0DDCA7-E7D7-4F83-B5BD-6B5D1AC9DDA7}" sibTransId="{1EF05B3C-79E2-430D-87C5-A24A284B66F3}"/>
+    <dgm:cxn modelId="{B56FD173-8F58-48EB-BB61-0FC61960E665}" type="presOf" srcId="{3BC7471E-1D96-4380-A909-52284375D05F}" destId="{699F36DB-862F-4C77-B4C1-F2D79E8CD475}" srcOrd="0" destOrd="0" presId="urn:microsoft.com/office/officeart/2005/8/layout/hierarchy2"/>
+    <dgm:cxn modelId="{78761539-D45B-4B36-97C6-5DB050286C28}" type="presOf" srcId="{10E06AE5-7B5C-4249-9A50-CA231E1A53B8}" destId="{99BCE6CA-01BB-4C82-AA51-F8CEB688CCA7}" srcOrd="0" destOrd="0" presId="urn:microsoft.com/office/officeart/2005/8/layout/hierarchy2"/>
+    <dgm:cxn modelId="{DB1627BB-A61E-442D-8EFD-403AAC854F1B}" srcId="{3BC7471E-1D96-4380-A909-52284375D05F}" destId="{94ADDC59-067A-4C51-872A-44479A6EED3D}" srcOrd="0" destOrd="0" parTransId="{C120922A-3514-4D40-AA5A-0240F91FD9C7}" sibTransId="{F9681722-5D73-41B4-8D43-FDD34601A7AF}"/>
+    <dgm:cxn modelId="{265FB9E8-A24C-4566-8A6E-3169F21CE1C0}" type="presOf" srcId="{C120922A-3514-4D40-AA5A-0240F91FD9C7}" destId="{CFEF8F59-F70D-4463-BE3C-4EC220C677EB}" srcOrd="0" destOrd="0" presId="urn:microsoft.com/office/officeart/2005/8/layout/hierarchy2"/>
+    <dgm:cxn modelId="{ACCCC16A-5FFB-44BE-AB05-6CD3857AFD81}" type="presOf" srcId="{94ADDC59-067A-4C51-872A-44479A6EED3D}" destId="{A709A1B8-61AC-4A42-8F5D-3682C508E1EF}" srcOrd="0" destOrd="0" presId="urn:microsoft.com/office/officeart/2005/8/layout/hierarchy2"/>
+    <dgm:cxn modelId="{F0DEA901-5C3B-47AF-91C3-20168173A8A2}" type="presOf" srcId="{BF9CA6D6-C72B-475F-9E77-1429B2577A97}" destId="{A1F7FB1D-62D8-4929-9B76-75789231D2D2}" srcOrd="0" destOrd="0" presId="urn:microsoft.com/office/officeart/2005/8/layout/hierarchy2"/>
+    <dgm:cxn modelId="{0D155A06-60B2-4DBF-989F-FD2D8EA6CD22}" type="presOf" srcId="{10E06AE5-7B5C-4249-9A50-CA231E1A53B8}" destId="{9F518FBB-059C-43EE-8AF6-4EB09A85C8CF}" srcOrd="1" destOrd="0" presId="urn:microsoft.com/office/officeart/2005/8/layout/hierarchy2"/>
+    <dgm:cxn modelId="{AD7DB8AB-61B6-44E8-8A21-B649509C1B0A}" type="presOf" srcId="{53C1448F-3988-4167-85C3-CCBBE7542B9C}" destId="{D17873A2-71A1-40ED-B9D4-D402DBA26931}" srcOrd="0" destOrd="0" presId="urn:microsoft.com/office/officeart/2005/8/layout/hierarchy2"/>
+    <dgm:cxn modelId="{1DC495C6-3A05-49DD-8C79-929197527C33}" type="presOf" srcId="{8FAAEC49-56C2-4D9C-945E-91611FD7AD52}" destId="{92F2AF6B-9ECE-45F2-AB9A-F5920934ADB8}" srcOrd="0" destOrd="0" presId="urn:microsoft.com/office/officeart/2005/8/layout/hierarchy2"/>
+    <dgm:cxn modelId="{6C80D2CD-80DD-45FE-A334-937313D2DBBA}" type="presOf" srcId="{3D39EDB7-E87B-4344-99FB-C83582A134D5}" destId="{E653A59D-C4D5-4103-A4E2-9BFAD8B903FB}" srcOrd="0" destOrd="0" presId="urn:microsoft.com/office/officeart/2005/8/layout/hierarchy2"/>
+    <dgm:cxn modelId="{00FD1204-5CF9-40E5-8D5D-02A213E5C872}" type="presOf" srcId="{EE26A890-2583-439F-9770-6601F93FDCEF}" destId="{1BAE54A3-B719-4AAC-B04F-6234831A7E40}" srcOrd="1" destOrd="0" presId="urn:microsoft.com/office/officeart/2005/8/layout/hierarchy2"/>
+    <dgm:cxn modelId="{B7CF9BE1-DE41-4AA9-BD37-D8436B09DEF5}" type="presOf" srcId="{C120922A-3514-4D40-AA5A-0240F91FD9C7}" destId="{902FB5CB-8755-41AE-A266-B99A46E3A5D6}" srcOrd="1" destOrd="0" presId="urn:microsoft.com/office/officeart/2005/8/layout/hierarchy2"/>
+    <dgm:cxn modelId="{982588C8-5B88-4D0E-BB9D-CA1E0C44B55A}" type="presOf" srcId="{3CC7B6BB-B52C-4A13-B5DE-0A907012BD20}" destId="{443CB2BE-876D-4221-9C0E-B549FAAB6BBA}" srcOrd="1" destOrd="0" presId="urn:microsoft.com/office/officeart/2005/8/layout/hierarchy2"/>
+    <dgm:cxn modelId="{D7ED5E25-841A-4CBC-977C-910A269851AF}" srcId="{8FAAEC49-56C2-4D9C-945E-91611FD7AD52}" destId="{3D39EDB7-E87B-4344-99FB-C83582A134D5}" srcOrd="1" destOrd="0" parTransId="{D59A7AB3-ACD6-4F4F-AA24-B9F9F0E6C07C}" sibTransId="{65106CA0-21DF-4258-8F62-4CDE1FF87E34}"/>
+    <dgm:cxn modelId="{11A36E49-CB67-4F74-9F9C-AC576DA2D1AB}" type="presOf" srcId="{EE26A890-2583-439F-9770-6601F93FDCEF}" destId="{1C8EA34C-65B4-4B94-8D13-4E285225CE55}" srcOrd="0" destOrd="0" presId="urn:microsoft.com/office/officeart/2005/8/layout/hierarchy2"/>
     <dgm:cxn modelId="{2AD28D9F-04FB-41DF-8906-69D9151E99FD}" srcId="{0A448312-3B0C-4540-B505-6A03E30E35CA}" destId="{3BC7471E-1D96-4380-A909-52284375D05F}" srcOrd="0" destOrd="0" parTransId="{10E06AE5-7B5C-4249-9A50-CA231E1A53B8}" sibTransId="{D8625685-862E-4302-B4D5-08F7B0F9BCEB}"/>
-    <dgm:cxn modelId="{265FB9E8-A24C-4566-8A6E-3169F21CE1C0}" type="presOf" srcId="{C120922A-3514-4D40-AA5A-0240F91FD9C7}" destId="{CFEF8F59-F70D-4463-BE3C-4EC220C677EB}" srcOrd="0" destOrd="0" presId="urn:microsoft.com/office/officeart/2005/8/layout/hierarchy2"/>
-    <dgm:cxn modelId="{78761539-D45B-4B36-97C6-5DB050286C28}" type="presOf" srcId="{10E06AE5-7B5C-4249-9A50-CA231E1A53B8}" destId="{99BCE6CA-01BB-4C82-AA51-F8CEB688CCA7}" srcOrd="0" destOrd="0" presId="urn:microsoft.com/office/officeart/2005/8/layout/hierarchy2"/>
-    <dgm:cxn modelId="{ACCCC16A-5FFB-44BE-AB05-6CD3857AFD81}" type="presOf" srcId="{94ADDC59-067A-4C51-872A-44479A6EED3D}" destId="{A709A1B8-61AC-4A42-8F5D-3682C508E1EF}" srcOrd="0" destOrd="0" presId="urn:microsoft.com/office/officeart/2005/8/layout/hierarchy2"/>
-    <dgm:cxn modelId="{B7CF9BE1-DE41-4AA9-BD37-D8436B09DEF5}" type="presOf" srcId="{C120922A-3514-4D40-AA5A-0240F91FD9C7}" destId="{902FB5CB-8755-41AE-A266-B99A46E3A5D6}" srcOrd="1" destOrd="0" presId="urn:microsoft.com/office/officeart/2005/8/layout/hierarchy2"/>
-    <dgm:cxn modelId="{8A7233C2-ADCE-4D0A-8DBD-B5D6215FC37C}" srcId="{3BC7471E-1D96-4380-A909-52284375D05F}" destId="{53C1448F-3988-4167-85C3-CCBBE7542B9C}" srcOrd="1" destOrd="0" parTransId="{3CC7B6BB-B52C-4A13-B5DE-0A907012BD20}" sibTransId="{13CED3B3-DD1D-4935-B809-800E04365F44}"/>
-    <dgm:cxn modelId="{AD7DB8AB-61B6-44E8-8A21-B649509C1B0A}" type="presOf" srcId="{53C1448F-3988-4167-85C3-CCBBE7542B9C}" destId="{D17873A2-71A1-40ED-B9D4-D402DBA26931}" srcOrd="0" destOrd="0" presId="urn:microsoft.com/office/officeart/2005/8/layout/hierarchy2"/>
     <dgm:cxn modelId="{54E99B52-1211-4068-8094-875251CCE02D}" type="presOf" srcId="{3CC7B6BB-B52C-4A13-B5DE-0A907012BD20}" destId="{5491C858-BB3A-4BCA-AC42-A6EEFFAD6FA1}" srcOrd="0" destOrd="0" presId="urn:microsoft.com/office/officeart/2005/8/layout/hierarchy2"/>
-    <dgm:cxn modelId="{00FD1204-5CF9-40E5-8D5D-02A213E5C872}" type="presOf" srcId="{EE26A890-2583-439F-9770-6601F93FDCEF}" destId="{1BAE54A3-B719-4AAC-B04F-6234831A7E40}" srcOrd="1" destOrd="0" presId="urn:microsoft.com/office/officeart/2005/8/layout/hierarchy2"/>
-    <dgm:cxn modelId="{DB1627BB-A61E-442D-8EFD-403AAC854F1B}" srcId="{3BC7471E-1D96-4380-A909-52284375D05F}" destId="{94ADDC59-067A-4C51-872A-44479A6EED3D}" srcOrd="0" destOrd="0" parTransId="{C120922A-3514-4D40-AA5A-0240F91FD9C7}" sibTransId="{F9681722-5D73-41B4-8D43-FDD34601A7AF}"/>
-    <dgm:cxn modelId="{982588C8-5B88-4D0E-BB9D-CA1E0C44B55A}" type="presOf" srcId="{3CC7B6BB-B52C-4A13-B5DE-0A907012BD20}" destId="{443CB2BE-876D-4221-9C0E-B549FAAB6BBA}" srcOrd="1" destOrd="0" presId="urn:microsoft.com/office/officeart/2005/8/layout/hierarchy2"/>
-    <dgm:cxn modelId="{6C80D2CD-80DD-45FE-A334-937313D2DBBA}" type="presOf" srcId="{3D39EDB7-E87B-4344-99FB-C83582A134D5}" destId="{E653A59D-C4D5-4103-A4E2-9BFAD8B903FB}" srcOrd="0" destOrd="0" presId="urn:microsoft.com/office/officeart/2005/8/layout/hierarchy2"/>
-    <dgm:cxn modelId="{A6111E65-51A6-40B4-8542-6045DFFEBA9F}" srcId="{0A448312-3B0C-4540-B505-6A03E30E35CA}" destId="{BF9CA6D6-C72B-475F-9E77-1429B2577A97}" srcOrd="1" destOrd="0" parTransId="{EE26A890-2583-439F-9770-6601F93FDCEF}" sibTransId="{C9056885-D3C8-4CD3-87E3-96AA7E23D960}"/>
-    <dgm:cxn modelId="{6D84FB39-F60E-4195-9BA7-A18A415105E7}" srcId="{8FAAEC49-56C2-4D9C-945E-91611FD7AD52}" destId="{0A448312-3B0C-4540-B505-6A03E30E35CA}" srcOrd="0" destOrd="0" parTransId="{CD0DDCA7-E7D7-4F83-B5BD-6B5D1AC9DDA7}" sibTransId="{1EF05B3C-79E2-430D-87C5-A24A284B66F3}"/>
-    <dgm:cxn modelId="{0D155A06-60B2-4DBF-989F-FD2D8EA6CD22}" type="presOf" srcId="{10E06AE5-7B5C-4249-9A50-CA231E1A53B8}" destId="{9F518FBB-059C-43EE-8AF6-4EB09A85C8CF}" srcOrd="1" destOrd="0" presId="urn:microsoft.com/office/officeart/2005/8/layout/hierarchy2"/>
-    <dgm:cxn modelId="{11A36E49-CB67-4F74-9F9C-AC576DA2D1AB}" type="presOf" srcId="{EE26A890-2583-439F-9770-6601F93FDCEF}" destId="{1C8EA34C-65B4-4B94-8D13-4E285225CE55}" srcOrd="0" destOrd="0" presId="urn:microsoft.com/office/officeart/2005/8/layout/hierarchy2"/>
-    <dgm:cxn modelId="{B56FD173-8F58-48EB-BB61-0FC61960E665}" type="presOf" srcId="{3BC7471E-1D96-4380-A909-52284375D05F}" destId="{699F36DB-862F-4C77-B4C1-F2D79E8CD475}" srcOrd="0" destOrd="0" presId="urn:microsoft.com/office/officeart/2005/8/layout/hierarchy2"/>
-    <dgm:cxn modelId="{F0DEA901-5C3B-47AF-91C3-20168173A8A2}" type="presOf" srcId="{BF9CA6D6-C72B-475F-9E77-1429B2577A97}" destId="{A1F7FB1D-62D8-4929-9B76-75789231D2D2}" srcOrd="0" destOrd="0" presId="urn:microsoft.com/office/officeart/2005/8/layout/hierarchy2"/>
-    <dgm:cxn modelId="{D7ED5E25-841A-4CBC-977C-910A269851AF}" srcId="{8FAAEC49-56C2-4D9C-945E-91611FD7AD52}" destId="{3D39EDB7-E87B-4344-99FB-C83582A134D5}" srcOrd="1" destOrd="0" parTransId="{D59A7AB3-ACD6-4F4F-AA24-B9F9F0E6C07C}" sibTransId="{65106CA0-21DF-4258-8F62-4CDE1FF87E34}"/>
     <dgm:cxn modelId="{5CA53262-313A-4102-9DAC-28AA327E9847}" type="presOf" srcId="{0A448312-3B0C-4540-B505-6A03E30E35CA}" destId="{F6FDD26B-5DB9-438C-99BA-B7315F954501}" srcOrd="0" destOrd="0" presId="urn:microsoft.com/office/officeart/2005/8/layout/hierarchy2"/>
-    <dgm:cxn modelId="{1DC495C6-3A05-49DD-8C79-929197527C33}" type="presOf" srcId="{8FAAEC49-56C2-4D9C-945E-91611FD7AD52}" destId="{92F2AF6B-9ECE-45F2-AB9A-F5920934ADB8}" srcOrd="0" destOrd="0" presId="urn:microsoft.com/office/officeart/2005/8/layout/hierarchy2"/>
     <dgm:cxn modelId="{F68B5E7B-6E10-46C8-B11B-01C98E247CDC}" type="presParOf" srcId="{92F2AF6B-9ECE-45F2-AB9A-F5920934ADB8}" destId="{B071A5F6-EE7B-40B8-9091-4E4774E56F4B}" srcOrd="0" destOrd="0" presId="urn:microsoft.com/office/officeart/2005/8/layout/hierarchy2"/>
     <dgm:cxn modelId="{E5035E6E-5C33-446B-A769-E98C6701A65F}" type="presParOf" srcId="{B071A5F6-EE7B-40B8-9091-4E4774E56F4B}" destId="{F6FDD26B-5DB9-438C-99BA-B7315F954501}" srcOrd="0" destOrd="0" presId="urn:microsoft.com/office/officeart/2005/8/layout/hierarchy2"/>
     <dgm:cxn modelId="{512C75E5-916F-42EA-9D27-6E12BE8A617A}" type="presParOf" srcId="{B071A5F6-EE7B-40B8-9091-4E4774E56F4B}" destId="{3BC56FAD-3BAE-4E1D-BC2B-4D3E81D5EDF1}" srcOrd="1" destOrd="0" presId="urn:microsoft.com/office/officeart/2005/8/layout/hierarchy2"/>
@@ -6895,7 +7007,8 @@
           <a:p>
             <a:fld id="{FD3EE9E1-6495-4B78-A405-26DD950030FB}" type="datetimeFigureOut">
               <a:rPr lang="en-US" smtClean="0"/>
-              <a:t>5/13/2013</a:t>
+              <a:pPr/>
+              <a:t>5/14/2013</a:t>
             </a:fld>
             <a:endParaRPr lang="en-US"/>
           </a:p>
@@ -7056,6 +7169,7 @@
           <a:p>
             <a:fld id="{775CE60F-A63E-441E-A4CB-0F10D47FBFBB}" type="slidenum">
               <a:rPr lang="en-US" smtClean="0"/>
+              <a:pPr/>
               <a:t>‹#›</a:t>
             </a:fld>
             <a:endParaRPr lang="en-US"/>
@@ -7342,7 +7456,7 @@
             <a:fld id="{858F1210-461C-4B8C-AF88-90F2C10DD410}" type="datetimeFigureOut">
               <a:rPr lang="en-US" smtClean="0"/>
               <a:pPr/>
-              <a:t>5/13/2013</a:t>
+              <a:t>5/14/2013</a:t>
             </a:fld>
             <a:endParaRPr lang="en-US"/>
           </a:p>
@@ -7509,7 +7623,7 @@
             <a:fld id="{858F1210-461C-4B8C-AF88-90F2C10DD410}" type="datetimeFigureOut">
               <a:rPr lang="en-US" smtClean="0"/>
               <a:pPr/>
-              <a:t>5/13/2013</a:t>
+              <a:t>5/14/2013</a:t>
             </a:fld>
             <a:endParaRPr lang="en-US"/>
           </a:p>
@@ -7686,7 +7800,7 @@
             <a:fld id="{858F1210-461C-4B8C-AF88-90F2C10DD410}" type="datetimeFigureOut">
               <a:rPr lang="en-US" smtClean="0"/>
               <a:pPr/>
-              <a:t>5/13/2013</a:t>
+              <a:t>5/14/2013</a:t>
             </a:fld>
             <a:endParaRPr lang="en-US"/>
           </a:p>
@@ -8385,7 +8499,7 @@
             <a:fld id="{1D8BD707-D9CF-40AE-B4C6-C98DA3205C09}" type="datetimeFigureOut">
               <a:rPr lang="en-US" smtClean="0"/>
               <a:pPr/>
-              <a:t>5/13/2013</a:t>
+              <a:t>5/14/2013</a:t>
             </a:fld>
             <a:endParaRPr lang="en-US"/>
           </a:p>
@@ -8563,7 +8677,7 @@
                 </a:solidFill>
               </a:rPr>
               <a:pPr/>
-              <a:t>5/13/2013</a:t>
+              <a:t>5/14/2013</a:t>
             </a:fld>
             <a:endParaRPr lang="en-US">
               <a:solidFill>
@@ -8840,7 +8954,7 @@
                 </a:solidFill>
               </a:rPr>
               <a:pPr/>
-              <a:t>5/13/2013</a:t>
+              <a:t>5/14/2013</a:t>
             </a:fld>
             <a:endParaRPr lang="en-US">
               <a:solidFill>
@@ -9277,7 +9391,7 @@
                 </a:solidFill>
               </a:rPr>
               <a:pPr/>
-              <a:t>5/13/2013</a:t>
+              <a:t>5/14/2013</a:t>
             </a:fld>
             <a:endParaRPr lang="en-US">
               <a:solidFill>
@@ -9745,7 +9859,7 @@
                 </a:solidFill>
               </a:rPr>
               <a:pPr/>
-              <a:t>5/13/2013</a:t>
+              <a:t>5/14/2013</a:t>
             </a:fld>
             <a:endParaRPr lang="en-US">
               <a:solidFill>
@@ -9868,7 +9982,7 @@
                 </a:solidFill>
               </a:rPr>
               <a:pPr/>
-              <a:t>5/13/2013</a:t>
+              <a:t>5/14/2013</a:t>
             </a:fld>
             <a:endParaRPr lang="en-US">
               <a:solidFill>
@@ -10011,7 +10125,7 @@
                 </a:solidFill>
               </a:rPr>
               <a:pPr/>
-              <a:t>5/13/2013</a:t>
+              <a:t>5/14/2013</a:t>
             </a:fld>
             <a:endParaRPr lang="en-US">
               <a:solidFill>
@@ -10307,7 +10421,7 @@
                 </a:solidFill>
               </a:rPr>
               <a:pPr/>
-              <a:t>5/13/2013</a:t>
+              <a:t>5/14/2013</a:t>
             </a:fld>
             <a:endParaRPr lang="en-US">
               <a:solidFill>
@@ -10494,7 +10608,7 @@
             <a:fld id="{858F1210-461C-4B8C-AF88-90F2C10DD410}" type="datetimeFigureOut">
               <a:rPr lang="en-US" smtClean="0"/>
               <a:pPr/>
-              <a:t>5/13/2013</a:t>
+              <a:t>5/14/2013</a:t>
             </a:fld>
             <a:endParaRPr lang="en-US"/>
           </a:p>
@@ -10701,7 +10815,7 @@
                 </a:solidFill>
               </a:rPr>
               <a:pPr/>
-              <a:t>5/13/2013</a:t>
+              <a:t>5/14/2013</a:t>
             </a:fld>
             <a:endParaRPr lang="en-US">
               <a:solidFill>
@@ -11478,7 +11592,7 @@
                 </a:solidFill>
               </a:rPr>
               <a:pPr/>
-              <a:t>5/13/2013</a:t>
+              <a:t>5/14/2013</a:t>
             </a:fld>
             <a:endParaRPr lang="en-US">
               <a:solidFill>
@@ -11685,7 +11799,7 @@
                 </a:solidFill>
               </a:rPr>
               <a:pPr/>
-              <a:t>5/13/2013</a:t>
+              <a:t>5/14/2013</a:t>
             </a:fld>
             <a:endParaRPr lang="en-US">
               <a:solidFill>
@@ -11948,7 +12062,7 @@
             <a:fld id="{858F1210-461C-4B8C-AF88-90F2C10DD410}" type="datetimeFigureOut">
               <a:rPr lang="en-US" smtClean="0"/>
               <a:pPr/>
-              <a:t>5/13/2013</a:t>
+              <a:t>5/14/2013</a:t>
             </a:fld>
             <a:endParaRPr lang="en-US"/>
           </a:p>
@@ -12233,7 +12347,7 @@
             <a:fld id="{858F1210-461C-4B8C-AF88-90F2C10DD410}" type="datetimeFigureOut">
               <a:rPr lang="en-US" smtClean="0"/>
               <a:pPr/>
-              <a:t>5/13/2013</a:t>
+              <a:t>5/14/2013</a:t>
             </a:fld>
             <a:endParaRPr lang="en-US"/>
           </a:p>
@@ -12652,7 +12766,7 @@
             <a:fld id="{858F1210-461C-4B8C-AF88-90F2C10DD410}" type="datetimeFigureOut">
               <a:rPr lang="en-US" smtClean="0"/>
               <a:pPr/>
-              <a:t>5/13/2013</a:t>
+              <a:t>5/14/2013</a:t>
             </a:fld>
             <a:endParaRPr lang="en-US"/>
           </a:p>
@@ -12767,7 +12881,7 @@
             <a:fld id="{858F1210-461C-4B8C-AF88-90F2C10DD410}" type="datetimeFigureOut">
               <a:rPr lang="en-US" smtClean="0"/>
               <a:pPr/>
-              <a:t>5/13/2013</a:t>
+              <a:t>5/14/2013</a:t>
             </a:fld>
             <a:endParaRPr lang="en-US"/>
           </a:p>
@@ -12859,7 +12973,7 @@
             <a:fld id="{858F1210-461C-4B8C-AF88-90F2C10DD410}" type="datetimeFigureOut">
               <a:rPr lang="en-US" smtClean="0"/>
               <a:pPr/>
-              <a:t>5/13/2013</a:t>
+              <a:t>5/14/2013</a:t>
             </a:fld>
             <a:endParaRPr lang="en-US"/>
           </a:p>
@@ -13133,7 +13247,7 @@
             <a:fld id="{858F1210-461C-4B8C-AF88-90F2C10DD410}" type="datetimeFigureOut">
               <a:rPr lang="en-US" smtClean="0"/>
               <a:pPr/>
-              <a:t>5/13/2013</a:t>
+              <a:t>5/14/2013</a:t>
             </a:fld>
             <a:endParaRPr lang="en-US"/>
           </a:p>
@@ -13383,7 +13497,7 @@
             <a:fld id="{858F1210-461C-4B8C-AF88-90F2C10DD410}" type="datetimeFigureOut">
               <a:rPr lang="en-US" smtClean="0"/>
               <a:pPr/>
-              <a:t>5/13/2013</a:t>
+              <a:t>5/14/2013</a:t>
             </a:fld>
             <a:endParaRPr lang="en-US"/>
           </a:p>
@@ -13593,7 +13707,7 @@
             <a:fld id="{858F1210-461C-4B8C-AF88-90F2C10DD410}" type="datetimeFigureOut">
               <a:rPr lang="en-US" smtClean="0"/>
               <a:pPr/>
-              <a:t>5/13/2013</a:t>
+              <a:t>5/14/2013</a:t>
             </a:fld>
             <a:endParaRPr lang="en-US"/>
           </a:p>
@@ -14456,7 +14570,7 @@
                 </a:solidFill>
               </a:rPr>
               <a:pPr/>
-              <a:t>5/13/2013</a:t>
+              <a:t>5/14/2013</a:t>
             </a:fld>
             <a:endParaRPr lang="en-US">
               <a:solidFill>
@@ -15506,7 +15620,7 @@
     </p:spTree>
     <p:extLst>
       <p:ext uri="{BB962C8B-B14F-4D97-AF65-F5344CB8AC3E}">
-        <p14:creationId xmlns:p14="http://schemas.microsoft.com/office/powerpoint/2010/main" xmlns="" val="2377328438"/>
+        <p14:creationId xmlns="" xmlns:p14="http://schemas.microsoft.com/office/powerpoint/2010/main" val="2377328438"/>
       </p:ext>
     </p:extLst>
   </p:cSld>
@@ -16586,7 +16700,7 @@
     </p:spTree>
     <p:extLst>
       <p:ext uri="{BB962C8B-B14F-4D97-AF65-F5344CB8AC3E}">
-        <p14:creationId xmlns:p14="http://schemas.microsoft.com/office/powerpoint/2010/main" xmlns="" val="112864573"/>
+        <p14:creationId xmlns="" xmlns:p14="http://schemas.microsoft.com/office/powerpoint/2010/main" val="112864573"/>
       </p:ext>
     </p:extLst>
   </p:cSld>
@@ -16818,7 +16932,7 @@
     </p:spTree>
     <p:extLst>
       <p:ext uri="{BB962C8B-B14F-4D97-AF65-F5344CB8AC3E}">
-        <p14:creationId xmlns:p14="http://schemas.microsoft.com/office/powerpoint/2010/main" xmlns="" val="2621016669"/>
+        <p14:creationId xmlns="" xmlns:p14="http://schemas.microsoft.com/office/powerpoint/2010/main" val="2621016669"/>
       </p:ext>
     </p:extLst>
   </p:cSld>
@@ -17001,7 +17115,7 @@
     </p:spTree>
     <p:extLst>
       <p:ext uri="{BB962C8B-B14F-4D97-AF65-F5344CB8AC3E}">
-        <p14:creationId xmlns:p14="http://schemas.microsoft.com/office/powerpoint/2010/main" xmlns="" val="3241919929"/>
+        <p14:creationId xmlns="" xmlns:p14="http://schemas.microsoft.com/office/powerpoint/2010/main" val="3241919929"/>
       </p:ext>
     </p:extLst>
   </p:cSld>
@@ -17468,7 +17582,7 @@
     </p:spTree>
     <p:extLst>
       <p:ext uri="{BB962C8B-B14F-4D97-AF65-F5344CB8AC3E}">
-        <p14:creationId xmlns:p14="http://schemas.microsoft.com/office/powerpoint/2010/main" xmlns="" val="4271304336"/>
+        <p14:creationId xmlns="" xmlns:p14="http://schemas.microsoft.com/office/powerpoint/2010/main" val="4271304336"/>
       </p:ext>
     </p:extLst>
   </p:cSld>
@@ -18455,7 +18569,7 @@
     </p:spTree>
     <p:extLst>
       <p:ext uri="{BB962C8B-B14F-4D97-AF65-F5344CB8AC3E}">
-        <p14:creationId xmlns:p14="http://schemas.microsoft.com/office/powerpoint/2010/main" xmlns="" val="2871872482"/>
+        <p14:creationId xmlns="" xmlns:p14="http://schemas.microsoft.com/office/powerpoint/2010/main" val="2871872482"/>
       </p:ext>
     </p:extLst>
   </p:cSld>
@@ -19094,7 +19208,7 @@
     </p:spTree>
     <p:extLst>
       <p:ext uri="{BB962C8B-B14F-4D97-AF65-F5344CB8AC3E}">
-        <p14:creationId xmlns:p14="http://schemas.microsoft.com/office/powerpoint/2010/main" xmlns="" val="3250000436"/>
+        <p14:creationId xmlns="" xmlns:p14="http://schemas.microsoft.com/office/powerpoint/2010/main" val="3250000436"/>
       </p:ext>
     </p:extLst>
   </p:cSld>
@@ -19349,15 +19463,7 @@
           <a:p>
             <a:r>
               <a:rPr lang="en-US" dirty="0" smtClean="0"/>
-              <a:t>…though hopefully </a:t>
-            </a:r>
-            <a:r>
-              <a:rPr lang="en-US" dirty="0" smtClean="0"/>
-              <a:t>it won’t come to this</a:t>
-            </a:r>
-            <a:r>
-              <a:rPr lang="en-US" dirty="0" smtClean="0"/>
-              <a:t>…</a:t>
+              <a:t>…though hopefully it won’t come to this…</a:t>
             </a:r>
             <a:endParaRPr lang="en-US" dirty="0"/>
           </a:p>
@@ -20267,7 +20373,15 @@
           <a:p>
             <a:r>
               <a:rPr lang="en-US" dirty="0" smtClean="0"/>
-              <a:t>“Nothing is particularly if you divide it into small parts.” – Henry Ford</a:t>
+              <a:t>“Nothing is particularly </a:t>
+            </a:r>
+            <a:r>
+              <a:rPr lang="en-US" dirty="0" smtClean="0"/>
+              <a:t>hard if </a:t>
+            </a:r>
+            <a:r>
+              <a:rPr lang="en-US" dirty="0" smtClean="0"/>
+              <a:t>you divide it into small parts.” – Henry Ford</a:t>
             </a:r>
             <a:endParaRPr lang="en-US" dirty="0"/>
           </a:p>

</xml_diff>